<commit_message>
Präsentation CS2 Task 3 bearbeitet
</commit_message>
<xml_diff>
--- a/doc/CS1/Präsentation_CS1_Task_3_Blau.pptx
+++ b/doc/CS1/Präsentation_CS1_Task_3_Blau.pptx
@@ -15521,33 +15521,6 @@
               <a:t>Hier steht ein Aufzählungspunkt, der etwas länger ist und über zwei Zeilen läuft</a:t>
             </a:r>
           </a:p>
-          <a:p>
-            <a:r>
-              <a:rPr lang="de-DE" dirty="0"/>
-              <a:t>Hier steht ein Aufzählungspunkt, der etwas länger ist und über zwei Zeilen läuft</a:t>
-            </a:r>
-          </a:p>
-          <a:p>
-            <a:r>
-              <a:rPr lang="de-DE" dirty="0"/>
-              <a:t>Hier steht ein kürzerer Text</a:t>
-            </a:r>
-          </a:p>
-          <a:p>
-            <a:r>
-              <a:rPr lang="de-DE" dirty="0"/>
-              <a:t>Hier steht ein Aufzählungspunkt, der etwas länger ist und über zwei Zeilen läuft</a:t>
-            </a:r>
-          </a:p>
-          <a:p>
-            <a:r>
-              <a:rPr lang="de-DE" dirty="0"/>
-              <a:t>Hier steht ein Aufzählungspunkt, der etwas länger ist und über zwei Zeilen läuft</a:t>
-            </a:r>
-          </a:p>
-          <a:p>
-            <a:endParaRPr lang="de-DE" dirty="0"/>
-          </a:p>
         </p:txBody>
       </p:sp>
       <p:sp>
@@ -18914,33 +18887,6 @@
               <a:t>Hier steht ein Aufzählungspunkt, der etwas länger ist und über zwei Zeilen läuft</a:t>
             </a:r>
           </a:p>
-          <a:p>
-            <a:r>
-              <a:rPr lang="de-DE" dirty="0"/>
-              <a:t>Hier steht ein Aufzählungspunkt, der etwas länger ist und über zwei Zeilen läuft</a:t>
-            </a:r>
-          </a:p>
-          <a:p>
-            <a:r>
-              <a:rPr lang="de-DE" dirty="0"/>
-              <a:t>Hier steht ein kürzerer Text</a:t>
-            </a:r>
-          </a:p>
-          <a:p>
-            <a:r>
-              <a:rPr lang="de-DE" dirty="0"/>
-              <a:t>Hier steht ein Aufzählungspunkt, der etwas länger ist und über zwei Zeilen läuft</a:t>
-            </a:r>
-          </a:p>
-          <a:p>
-            <a:r>
-              <a:rPr lang="de-DE" dirty="0"/>
-              <a:t>Hier steht ein Aufzählungspunkt, der etwas länger ist und über zwei Zeilen läuft</a:t>
-            </a:r>
-          </a:p>
-          <a:p>
-            <a:endParaRPr lang="de-DE" dirty="0"/>
-          </a:p>
         </p:txBody>
       </p:sp>
       <p:sp>
@@ -19053,33 +18999,6 @@
               <a:rPr lang="de-DE" dirty="0"/>
               <a:t>Hier steht ein Aufzählungspunkt, der etwas länger ist und über zwei Zeilen läuft</a:t>
             </a:r>
-          </a:p>
-          <a:p>
-            <a:r>
-              <a:rPr lang="de-DE" dirty="0"/>
-              <a:t>Hier steht ein Aufzählungspunkt, der etwas länger ist und über zwei Zeilen läuft</a:t>
-            </a:r>
-          </a:p>
-          <a:p>
-            <a:r>
-              <a:rPr lang="de-DE" dirty="0"/>
-              <a:t>Hier steht ein kürzerer Text</a:t>
-            </a:r>
-          </a:p>
-          <a:p>
-            <a:r>
-              <a:rPr lang="de-DE" dirty="0"/>
-              <a:t>Hier steht ein Aufzählungspunkt, der etwas länger ist und über zwei Zeilen läuft</a:t>
-            </a:r>
-          </a:p>
-          <a:p>
-            <a:r>
-              <a:rPr lang="de-DE" dirty="0"/>
-              <a:t>Hier steht ein Aufzählungspunkt, der etwas länger ist und über zwei Zeilen läuft</a:t>
-            </a:r>
-          </a:p>
-          <a:p>
-            <a:endParaRPr lang="de-DE" dirty="0"/>
           </a:p>
         </p:txBody>
       </p:sp>
@@ -20954,6 +20873,15 @@
 </file>
 
 <file path=customXml/item1.xml><?xml version="1.0" encoding="utf-8"?>
+<?mso-contentType ?>
+<FormTemplates xmlns="http://schemas.microsoft.com/sharepoint/v3/contenttype/forms">
+  <Display>DocumentLibraryForm</Display>
+  <Edit>DocumentLibraryForm</Edit>
+  <New>DocumentLibraryForm</New>
+</FormTemplates>
+</file>
+
+<file path=customXml/item2.xml><?xml version="1.0" encoding="utf-8"?>
 <p:properties xmlns:p="http://schemas.microsoft.com/office/2006/metadata/properties" xmlns:xsi="http://www.w3.org/2001/XMLSchema-instance">
   <documentManagement>
     <Betriebsystem xmlns="238ac175-5152-443e-bf42-417a27926292">Windows/Mac</Betriebsystem>
@@ -20961,15 +20889,6 @@
     <Kategorie xmlns="238ac175-5152-443e-bf42-417a27926292">Powerpoint</Kategorie>
   </documentManagement>
 </p:properties>
-</file>
-
-<file path=customXml/item2.xml><?xml version="1.0" encoding="utf-8"?>
-<?mso-contentType ?>
-<FormTemplates xmlns="http://schemas.microsoft.com/sharepoint/v3/contenttype/forms">
-  <Display>DocumentLibraryForm</Display>
-  <Edit>DocumentLibraryForm</Edit>
-  <New>DocumentLibraryForm</New>
-</FormTemplates>
 </file>
 
 <file path=customXml/item3.xml><?xml version="1.0" encoding="utf-8"?>
@@ -21057,18 +20976,18 @@
 </file>
 
 <file path=customXml/itemProps1.xml><?xml version="1.0" encoding="utf-8"?>
-<ds:datastoreItem xmlns:ds="http://schemas.openxmlformats.org/officeDocument/2006/customXml" ds:itemID="{F1B07C9B-62EC-4346-AB37-FD9874CBA0EB}">
+<ds:datastoreItem xmlns:ds="http://schemas.openxmlformats.org/officeDocument/2006/customXml" ds:itemID="{FCD14AB6-6E58-442F-B70D-2B317664A115}">
   <ds:schemaRefs>
-    <ds:schemaRef ds:uri="http://schemas.microsoft.com/office/2006/metadata/properties"/>
-    <ds:schemaRef ds:uri="238ac175-5152-443e-bf42-417a27926292"/>
+    <ds:schemaRef ds:uri="http://schemas.microsoft.com/sharepoint/v3/contenttype/forms"/>
   </ds:schemaRefs>
 </ds:datastoreItem>
 </file>
 
 <file path=customXml/itemProps2.xml><?xml version="1.0" encoding="utf-8"?>
-<ds:datastoreItem xmlns:ds="http://schemas.openxmlformats.org/officeDocument/2006/customXml" ds:itemID="{FCD14AB6-6E58-442F-B70D-2B317664A115}">
+<ds:datastoreItem xmlns:ds="http://schemas.openxmlformats.org/officeDocument/2006/customXml" ds:itemID="{F1B07C9B-62EC-4346-AB37-FD9874CBA0EB}">
   <ds:schemaRefs>
-    <ds:schemaRef ds:uri="http://schemas.microsoft.com/sharepoint/v3/contenttype/forms"/>
+    <ds:schemaRef ds:uri="http://schemas.microsoft.com/office/2006/metadata/properties"/>
+    <ds:schemaRef ds:uri="238ac175-5152-443e-bf42-417a27926292"/>
   </ds:schemaRefs>
 </ds:datastoreItem>
 </file>

</xml_diff>

<commit_message>
Präsentation CS1 Task 3 bearbeitet
</commit_message>
<xml_diff>
--- a/doc/CS1/Präsentation_CS1_Task_3_Blau.pptx
+++ b/doc/CS1/Präsentation_CS1_Task_3_Blau.pptx
@@ -5,42 +5,41 @@
     <p:sldMasterId id="2147483669" r:id="rId4"/>
   </p:sldMasterIdLst>
   <p:notesMasterIdLst>
-    <p:notesMasterId r:id="rId35"/>
+    <p:notesMasterId r:id="rId34"/>
   </p:notesMasterIdLst>
   <p:handoutMasterIdLst>
-    <p:handoutMasterId r:id="rId36"/>
+    <p:handoutMasterId r:id="rId35"/>
   </p:handoutMasterIdLst>
   <p:sldIdLst>
     <p:sldId id="256" r:id="rId5"/>
     <p:sldId id="283" r:id="rId6"/>
-    <p:sldId id="284" r:id="rId7"/>
-    <p:sldId id="289" r:id="rId8"/>
-    <p:sldId id="290" r:id="rId9"/>
-    <p:sldId id="291" r:id="rId10"/>
-    <p:sldId id="292" r:id="rId11"/>
-    <p:sldId id="282" r:id="rId12"/>
-    <p:sldId id="286" r:id="rId13"/>
-    <p:sldId id="299" r:id="rId14"/>
-    <p:sldId id="300" r:id="rId15"/>
-    <p:sldId id="301" r:id="rId16"/>
-    <p:sldId id="302" r:id="rId17"/>
-    <p:sldId id="303" r:id="rId18"/>
-    <p:sldId id="304" r:id="rId19"/>
-    <p:sldId id="305" r:id="rId20"/>
-    <p:sldId id="306" r:id="rId21"/>
-    <p:sldId id="307" r:id="rId22"/>
-    <p:sldId id="308" r:id="rId23"/>
-    <p:sldId id="309" r:id="rId24"/>
-    <p:sldId id="310" r:id="rId25"/>
-    <p:sldId id="311" r:id="rId26"/>
-    <p:sldId id="293" r:id="rId27"/>
-    <p:sldId id="294" r:id="rId28"/>
-    <p:sldId id="295" r:id="rId29"/>
-    <p:sldId id="296" r:id="rId30"/>
-    <p:sldId id="297" r:id="rId31"/>
-    <p:sldId id="298" r:id="rId32"/>
-    <p:sldId id="288" r:id="rId33"/>
-    <p:sldId id="280" r:id="rId34"/>
+    <p:sldId id="289" r:id="rId7"/>
+    <p:sldId id="290" r:id="rId8"/>
+    <p:sldId id="291" r:id="rId9"/>
+    <p:sldId id="292" r:id="rId10"/>
+    <p:sldId id="282" r:id="rId11"/>
+    <p:sldId id="286" r:id="rId12"/>
+    <p:sldId id="299" r:id="rId13"/>
+    <p:sldId id="300" r:id="rId14"/>
+    <p:sldId id="301" r:id="rId15"/>
+    <p:sldId id="302" r:id="rId16"/>
+    <p:sldId id="303" r:id="rId17"/>
+    <p:sldId id="304" r:id="rId18"/>
+    <p:sldId id="305" r:id="rId19"/>
+    <p:sldId id="306" r:id="rId20"/>
+    <p:sldId id="307" r:id="rId21"/>
+    <p:sldId id="308" r:id="rId22"/>
+    <p:sldId id="309" r:id="rId23"/>
+    <p:sldId id="310" r:id="rId24"/>
+    <p:sldId id="311" r:id="rId25"/>
+    <p:sldId id="293" r:id="rId26"/>
+    <p:sldId id="294" r:id="rId27"/>
+    <p:sldId id="295" r:id="rId28"/>
+    <p:sldId id="296" r:id="rId29"/>
+    <p:sldId id="297" r:id="rId30"/>
+    <p:sldId id="298" r:id="rId31"/>
+    <p:sldId id="288" r:id="rId32"/>
+    <p:sldId id="280" r:id="rId33"/>
   </p:sldIdLst>
   <p:sldSz cx="9144000" cy="6858000" type="screen4x3"/>
   <p:notesSz cx="6797675" cy="9872663"/>
@@ -7064,15 +7063,15 @@
         </p:blipFill>
         <p:spPr>
           <a:xfrm>
-            <a:off x="1667068" y="1868557"/>
-            <a:ext cx="5917528" cy="3302807"/>
+            <a:off x="2049830" y="1699591"/>
+            <a:ext cx="5167231" cy="3336493"/>
           </a:xfrm>
         </p:spPr>
       </p:pic>
     </p:spTree>
     <p:extLst>
       <p:ext uri="{BB962C8B-B14F-4D97-AF65-F5344CB8AC3E}">
-        <p14:creationId xmlns:p14="http://schemas.microsoft.com/office/powerpoint/2010/main" val="3302576479"/>
+        <p14:creationId xmlns:p14="http://schemas.microsoft.com/office/powerpoint/2010/main" val="4011876790"/>
       </p:ext>
     </p:extLst>
   </p:cSld>
@@ -7140,15 +7139,15 @@
         </p:blipFill>
         <p:spPr>
           <a:xfrm>
-            <a:off x="2049831" y="1848679"/>
-            <a:ext cx="4936338" cy="3187405"/>
+            <a:off x="1194948" y="2087217"/>
+            <a:ext cx="7051606" cy="2758357"/>
           </a:xfrm>
         </p:spPr>
       </p:pic>
     </p:spTree>
     <p:extLst>
       <p:ext uri="{BB962C8B-B14F-4D97-AF65-F5344CB8AC3E}">
-        <p14:creationId xmlns:p14="http://schemas.microsoft.com/office/powerpoint/2010/main" val="4011876790"/>
+        <p14:creationId xmlns:p14="http://schemas.microsoft.com/office/powerpoint/2010/main" val="829692814"/>
       </p:ext>
     </p:extLst>
   </p:cSld>
@@ -7216,15 +7215,15 @@
         </p:blipFill>
         <p:spPr>
           <a:xfrm>
-            <a:off x="1284400" y="2315818"/>
-            <a:ext cx="6467199" cy="2529756"/>
+            <a:off x="1090168" y="1689654"/>
+            <a:ext cx="7038999" cy="3571856"/>
           </a:xfrm>
         </p:spPr>
       </p:pic>
     </p:spTree>
     <p:extLst>
       <p:ext uri="{BB962C8B-B14F-4D97-AF65-F5344CB8AC3E}">
-        <p14:creationId xmlns:p14="http://schemas.microsoft.com/office/powerpoint/2010/main" val="829692814"/>
+        <p14:creationId xmlns:p14="http://schemas.microsoft.com/office/powerpoint/2010/main" val="4240085327"/>
       </p:ext>
     </p:extLst>
   </p:cSld>
@@ -7292,15 +7291,15 @@
         </p:blipFill>
         <p:spPr>
           <a:xfrm>
-            <a:off x="2597052" y="2805063"/>
-            <a:ext cx="3841947" cy="1949550"/>
+            <a:off x="1332536" y="1424918"/>
+            <a:ext cx="6370927" cy="3882285"/>
           </a:xfrm>
         </p:spPr>
       </p:pic>
     </p:spTree>
     <p:extLst>
       <p:ext uri="{BB962C8B-B14F-4D97-AF65-F5344CB8AC3E}">
-        <p14:creationId xmlns:p14="http://schemas.microsoft.com/office/powerpoint/2010/main" val="4240085327"/>
+        <p14:creationId xmlns:p14="http://schemas.microsoft.com/office/powerpoint/2010/main" val="3797801775"/>
       </p:ext>
     </p:extLst>
   </p:cSld>
@@ -7352,7 +7351,7 @@
       </p:sp>
       <p:pic>
         <p:nvPicPr>
-          <p:cNvPr id="5" name="Inhaltsplatzhalter 4"/>
+          <p:cNvPr id="4" name="Inhaltsplatzhalter 3"/>
           <p:cNvPicPr>
             <a:picLocks noGrp="1" noChangeAspect="1"/>
           </p:cNvPicPr>
@@ -7368,15 +7367,15 @@
         </p:blipFill>
         <p:spPr>
           <a:xfrm>
-            <a:off x="2892342" y="2789187"/>
-            <a:ext cx="3251367" cy="1981302"/>
+            <a:off x="1062144" y="1445742"/>
+            <a:ext cx="7107822" cy="3713894"/>
           </a:xfrm>
         </p:spPr>
       </p:pic>
     </p:spTree>
     <p:extLst>
       <p:ext uri="{BB962C8B-B14F-4D97-AF65-F5344CB8AC3E}">
-        <p14:creationId xmlns:p14="http://schemas.microsoft.com/office/powerpoint/2010/main" val="3797801775"/>
+        <p14:creationId xmlns:p14="http://schemas.microsoft.com/office/powerpoint/2010/main" val="1038735950"/>
       </p:ext>
     </p:extLst>
   </p:cSld>
@@ -7444,15 +7443,15 @@
         </p:blipFill>
         <p:spPr>
           <a:xfrm>
-            <a:off x="2543074" y="2747910"/>
-            <a:ext cx="3949903" cy="2063856"/>
+            <a:off x="1080575" y="1401557"/>
+            <a:ext cx="6874850" cy="4068539"/>
           </a:xfrm>
         </p:spPr>
       </p:pic>
     </p:spTree>
     <p:extLst>
       <p:ext uri="{BB962C8B-B14F-4D97-AF65-F5344CB8AC3E}">
-        <p14:creationId xmlns:p14="http://schemas.microsoft.com/office/powerpoint/2010/main" val="1038735950"/>
+        <p14:creationId xmlns:p14="http://schemas.microsoft.com/office/powerpoint/2010/main" val="915173772"/>
       </p:ext>
     </p:extLst>
   </p:cSld>
@@ -7520,15 +7519,15 @@
         </p:blipFill>
         <p:spPr>
           <a:xfrm>
-            <a:off x="2736759" y="2725684"/>
-            <a:ext cx="3562533" cy="2108308"/>
+            <a:off x="1972005" y="1490912"/>
+            <a:ext cx="5402830" cy="3887529"/>
           </a:xfrm>
         </p:spPr>
       </p:pic>
     </p:spTree>
     <p:extLst>
       <p:ext uri="{BB962C8B-B14F-4D97-AF65-F5344CB8AC3E}">
-        <p14:creationId xmlns:p14="http://schemas.microsoft.com/office/powerpoint/2010/main" val="915173772"/>
+        <p14:creationId xmlns:p14="http://schemas.microsoft.com/office/powerpoint/2010/main" val="1508610167"/>
       </p:ext>
     </p:extLst>
   </p:cSld>
@@ -7596,15 +7595,15 @@
         </p:blipFill>
         <p:spPr>
           <a:xfrm>
-            <a:off x="2876466" y="2598677"/>
-            <a:ext cx="3283119" cy="2362321"/>
+            <a:off x="1955386" y="1198234"/>
+            <a:ext cx="5125227" cy="4207276"/>
           </a:xfrm>
         </p:spPr>
       </p:pic>
     </p:spTree>
     <p:extLst>
       <p:ext uri="{BB962C8B-B14F-4D97-AF65-F5344CB8AC3E}">
-        <p14:creationId xmlns:p14="http://schemas.microsoft.com/office/powerpoint/2010/main" val="1508610167"/>
+        <p14:creationId xmlns:p14="http://schemas.microsoft.com/office/powerpoint/2010/main" val="3561160234"/>
       </p:ext>
     </p:extLst>
   </p:cSld>
@@ -7672,15 +7671,15 @@
         </p:blipFill>
         <p:spPr>
           <a:xfrm>
-            <a:off x="2816138" y="2382766"/>
-            <a:ext cx="3403775" cy="2794144"/>
+            <a:off x="1273616" y="1480932"/>
+            <a:ext cx="6935879" cy="3970540"/>
           </a:xfrm>
         </p:spPr>
       </p:pic>
     </p:spTree>
     <p:extLst>
       <p:ext uri="{BB962C8B-B14F-4D97-AF65-F5344CB8AC3E}">
-        <p14:creationId xmlns:p14="http://schemas.microsoft.com/office/powerpoint/2010/main" val="3561160234"/>
+        <p14:creationId xmlns:p14="http://schemas.microsoft.com/office/powerpoint/2010/main" val="318381377"/>
       </p:ext>
     </p:extLst>
   </p:cSld>
@@ -7748,15 +7747,15 @@
         </p:blipFill>
         <p:spPr>
           <a:xfrm>
-            <a:off x="2327163" y="2525648"/>
-            <a:ext cx="4381725" cy="2508379"/>
+            <a:off x="939541" y="1520687"/>
+            <a:ext cx="7447414" cy="3653449"/>
           </a:xfrm>
         </p:spPr>
       </p:pic>
     </p:spTree>
     <p:extLst>
       <p:ext uri="{BB962C8B-B14F-4D97-AF65-F5344CB8AC3E}">
-        <p14:creationId xmlns:p14="http://schemas.microsoft.com/office/powerpoint/2010/main" val="318381377"/>
+        <p14:creationId xmlns:p14="http://schemas.microsoft.com/office/powerpoint/2010/main" val="3468731250"/>
       </p:ext>
     </p:extLst>
   </p:cSld>
@@ -7799,15 +7798,8 @@
           <a:lstStyle/>
           <a:p>
             <a:r>
-              <a:rPr lang="de-CH" dirty="0" err="1"/>
-              <a:t>Scoping</a:t>
-            </a:r>
-            <a:endParaRPr lang="de-CH" dirty="0"/>
-          </a:p>
-          <a:p>
-            <a:r>
               <a:rPr lang="de-CH" dirty="0"/>
-              <a:t>Research</a:t>
+              <a:t>Interview (Research)</a:t>
             </a:r>
           </a:p>
           <a:p>
@@ -7820,7 +7812,7 @@
           <a:p>
             <a:r>
               <a:rPr lang="de-CH" dirty="0"/>
-              <a:t>Design</a:t>
+              <a:t>Storyboard (Design)</a:t>
             </a:r>
           </a:p>
           <a:p>
@@ -7944,15 +7936,15 @@
         </p:blipFill>
         <p:spPr>
           <a:xfrm>
-            <a:off x="2162054" y="2624078"/>
-            <a:ext cx="4711942" cy="2311519"/>
+            <a:off x="1434440" y="1719241"/>
+            <a:ext cx="6516864" cy="3551940"/>
           </a:xfrm>
         </p:spPr>
       </p:pic>
     </p:spTree>
     <p:extLst>
       <p:ext uri="{BB962C8B-B14F-4D97-AF65-F5344CB8AC3E}">
-        <p14:creationId xmlns:p14="http://schemas.microsoft.com/office/powerpoint/2010/main" val="3468731250"/>
+        <p14:creationId xmlns:p14="http://schemas.microsoft.com/office/powerpoint/2010/main" val="1021873200"/>
       </p:ext>
     </p:extLst>
   </p:cSld>
@@ -8020,15 +8012,15 @@
         </p:blipFill>
         <p:spPr>
           <a:xfrm>
-            <a:off x="2438293" y="2646304"/>
-            <a:ext cx="4159464" cy="2267067"/>
+            <a:off x="957975" y="2097157"/>
+            <a:ext cx="7120049" cy="2849889"/>
           </a:xfrm>
         </p:spPr>
       </p:pic>
     </p:spTree>
     <p:extLst>
       <p:ext uri="{BB962C8B-B14F-4D97-AF65-F5344CB8AC3E}">
-        <p14:creationId xmlns:p14="http://schemas.microsoft.com/office/powerpoint/2010/main" val="1021873200"/>
+        <p14:creationId xmlns:p14="http://schemas.microsoft.com/office/powerpoint/2010/main" val="1976818652"/>
       </p:ext>
     </p:extLst>
   </p:cSld>
@@ -8055,32 +8047,9 @@
           <a:chExt cx="0" cy="0"/>
         </a:xfrm>
       </p:grpSpPr>
-      <p:sp>
-        <p:nvSpPr>
-          <p:cNvPr id="3" name="Titel 2"/>
-          <p:cNvSpPr>
-            <a:spLocks noGrp="1"/>
-          </p:cNvSpPr>
-          <p:nvPr>
-            <p:ph type="ctrTitle"/>
-          </p:nvPr>
-        </p:nvSpPr>
-        <p:spPr/>
-        <p:txBody>
-          <a:bodyPr/>
-          <a:lstStyle/>
-          <a:p>
-            <a:r>
-              <a:rPr lang="de-CH" dirty="0"/>
-              <a:t>Storyboard</a:t>
-            </a:r>
-            <a:endParaRPr lang="de-DE" dirty="0"/>
-          </a:p>
-        </p:txBody>
-      </p:sp>
       <p:pic>
         <p:nvPicPr>
-          <p:cNvPr id="4" name="Inhaltsplatzhalter 3"/>
+          <p:cNvPr id="4" name="Content Placeholder 3"/>
           <p:cNvPicPr>
             <a:picLocks noGrp="1" noChangeAspect="1"/>
           </p:cNvPicPr>
@@ -8096,15 +8065,78 @@
         </p:blipFill>
         <p:spPr>
           <a:xfrm>
-            <a:off x="2098551" y="2811413"/>
-            <a:ext cx="4838949" cy="1936850"/>
+            <a:off x="580481" y="1146429"/>
+            <a:ext cx="7875037" cy="5122673"/>
           </a:xfrm>
         </p:spPr>
       </p:pic>
+      <p:sp>
+        <p:nvSpPr>
+          <p:cNvPr id="3" name="Titel 2"/>
+          <p:cNvSpPr>
+            <a:spLocks noGrp="1"/>
+          </p:cNvSpPr>
+          <p:nvPr>
+            <p:ph type="ctrTitle"/>
+          </p:nvPr>
+        </p:nvSpPr>
+        <p:spPr/>
+        <p:txBody>
+          <a:bodyPr/>
+          <a:lstStyle/>
+          <a:p>
+            <a:r>
+              <a:rPr lang="de-DE" dirty="0"/>
+              <a:t>Prototyp</a:t>
+            </a:r>
+          </a:p>
+        </p:txBody>
+      </p:sp>
+      <p:sp>
+        <p:nvSpPr>
+          <p:cNvPr id="5" name="Rectangle 4">
+            <a:hlinkClick r:id="rId3" action="ppaction://hlinksldjump"/>
+          </p:cNvPr>
+          <p:cNvSpPr/>
+          <p:nvPr/>
+        </p:nvSpPr>
+        <p:spPr>
+          <a:xfrm>
+            <a:off x="3340359" y="4292082"/>
+            <a:ext cx="671804" cy="233265"/>
+          </a:xfrm>
+          <a:prstGeom prst="rect">
+            <a:avLst/>
+          </a:prstGeom>
+          <a:noFill/>
+        </p:spPr>
+        <p:style>
+          <a:lnRef idx="1">
+            <a:schemeClr val="accent1"/>
+          </a:lnRef>
+          <a:fillRef idx="3">
+            <a:schemeClr val="accent1"/>
+          </a:fillRef>
+          <a:effectRef idx="2">
+            <a:schemeClr val="accent1"/>
+          </a:effectRef>
+          <a:fontRef idx="minor">
+            <a:schemeClr val="lt1"/>
+          </a:fontRef>
+        </p:style>
+        <p:txBody>
+          <a:bodyPr rtlCol="0" anchor="ctr"/>
+          <a:lstStyle/>
+          <a:p>
+            <a:pPr algn="ctr"/>
+            <a:endParaRPr lang="en-GB"/>
+          </a:p>
+        </p:txBody>
+      </p:sp>
     </p:spTree>
     <p:extLst>
       <p:ext uri="{BB962C8B-B14F-4D97-AF65-F5344CB8AC3E}">
-        <p14:creationId xmlns:p14="http://schemas.microsoft.com/office/powerpoint/2010/main" val="1976818652"/>
+        <p14:creationId xmlns:p14="http://schemas.microsoft.com/office/powerpoint/2010/main" val="3278257248"/>
       </p:ext>
     </p:extLst>
   </p:cSld>
@@ -8149,14 +8181,14 @@
         </p:blipFill>
         <p:spPr>
           <a:xfrm>
-            <a:off x="580481" y="1146429"/>
-            <a:ext cx="7875037" cy="5122673"/>
+            <a:off x="828560" y="1126764"/>
+            <a:ext cx="7378879" cy="4843760"/>
           </a:xfrm>
         </p:spPr>
       </p:pic>
       <p:sp>
         <p:nvSpPr>
-          <p:cNvPr id="3" name="Titel 2"/>
+          <p:cNvPr id="3" name="Title 2"/>
           <p:cNvSpPr>
             <a:spLocks noGrp="1"/>
           </p:cNvSpPr>
@@ -8170,9 +8202,10 @@
           <a:lstStyle/>
           <a:p>
             <a:r>
-              <a:rPr lang="de-DE" dirty="0"/>
+              <a:rPr lang="en-GB" dirty="0" err="1"/>
               <a:t>Prototyp</a:t>
             </a:r>
+            <a:endParaRPr lang="en-GB" dirty="0"/>
           </a:p>
         </p:txBody>
       </p:sp>
@@ -8186,8 +8219,8 @@
         </p:nvSpPr>
         <p:spPr>
           <a:xfrm>
-            <a:off x="3340359" y="4292082"/>
-            <a:ext cx="671804" cy="233265"/>
+            <a:off x="6438122" y="3107094"/>
+            <a:ext cx="541176" cy="223935"/>
           </a:xfrm>
           <a:prstGeom prst="rect">
             <a:avLst/>
@@ -8220,7 +8253,7 @@
     </p:spTree>
     <p:extLst>
       <p:ext uri="{BB962C8B-B14F-4D97-AF65-F5344CB8AC3E}">
-        <p14:creationId xmlns:p14="http://schemas.microsoft.com/office/powerpoint/2010/main" val="3278257248"/>
+        <p14:creationId xmlns:p14="http://schemas.microsoft.com/office/powerpoint/2010/main" val="2022345022"/>
       </p:ext>
     </p:extLst>
   </p:cSld>
@@ -8265,8 +8298,8 @@
         </p:blipFill>
         <p:spPr>
           <a:xfrm>
-            <a:off x="828560" y="1126764"/>
-            <a:ext cx="7378879" cy="4843760"/>
+            <a:off x="597371" y="1053745"/>
+            <a:ext cx="7841258" cy="5066068"/>
           </a:xfrm>
         </p:spPr>
       </p:pic>
@@ -8303,8 +8336,8 @@
         </p:nvSpPr>
         <p:spPr>
           <a:xfrm>
-            <a:off x="6438122" y="3107094"/>
-            <a:ext cx="541176" cy="223935"/>
+            <a:off x="5598367" y="2248678"/>
+            <a:ext cx="718457" cy="186612"/>
           </a:xfrm>
           <a:prstGeom prst="rect">
             <a:avLst/>
@@ -8334,10 +8367,92 @@
           </a:p>
         </p:txBody>
       </p:sp>
+      <p:sp>
+        <p:nvSpPr>
+          <p:cNvPr id="6" name="Rectangle 5">
+            <a:hlinkClick r:id="rId4" action="ppaction://hlinksldjump"/>
+          </p:cNvPr>
+          <p:cNvSpPr/>
+          <p:nvPr/>
+        </p:nvSpPr>
+        <p:spPr>
+          <a:xfrm>
+            <a:off x="5598366" y="3400167"/>
+            <a:ext cx="718457" cy="186612"/>
+          </a:xfrm>
+          <a:prstGeom prst="rect">
+            <a:avLst/>
+          </a:prstGeom>
+          <a:noFill/>
+        </p:spPr>
+        <p:style>
+          <a:lnRef idx="1">
+            <a:schemeClr val="accent1"/>
+          </a:lnRef>
+          <a:fillRef idx="3">
+            <a:schemeClr val="accent1"/>
+          </a:fillRef>
+          <a:effectRef idx="2">
+            <a:schemeClr val="accent1"/>
+          </a:effectRef>
+          <a:fontRef idx="minor">
+            <a:schemeClr val="lt1"/>
+          </a:fontRef>
+        </p:style>
+        <p:txBody>
+          <a:bodyPr rtlCol="0" anchor="ctr"/>
+          <a:lstStyle/>
+          <a:p>
+            <a:pPr algn="ctr"/>
+            <a:endParaRPr lang="en-GB"/>
+          </a:p>
+        </p:txBody>
+      </p:sp>
+      <p:sp>
+        <p:nvSpPr>
+          <p:cNvPr id="7" name="Rectangle 6">
+            <a:hlinkClick r:id="rId5" action="ppaction://hlinksldjump"/>
+          </p:cNvPr>
+          <p:cNvSpPr/>
+          <p:nvPr/>
+        </p:nvSpPr>
+        <p:spPr>
+          <a:xfrm>
+            <a:off x="5598365" y="4551656"/>
+            <a:ext cx="718457" cy="186612"/>
+          </a:xfrm>
+          <a:prstGeom prst="rect">
+            <a:avLst/>
+          </a:prstGeom>
+          <a:noFill/>
+        </p:spPr>
+        <p:style>
+          <a:lnRef idx="1">
+            <a:schemeClr val="accent1"/>
+          </a:lnRef>
+          <a:fillRef idx="3">
+            <a:schemeClr val="accent1"/>
+          </a:fillRef>
+          <a:effectRef idx="2">
+            <a:schemeClr val="accent1"/>
+          </a:effectRef>
+          <a:fontRef idx="minor">
+            <a:schemeClr val="lt1"/>
+          </a:fontRef>
+        </p:style>
+        <p:txBody>
+          <a:bodyPr rtlCol="0" anchor="ctr"/>
+          <a:lstStyle/>
+          <a:p>
+            <a:pPr algn="ctr"/>
+            <a:endParaRPr lang="en-GB"/>
+          </a:p>
+        </p:txBody>
+      </p:sp>
     </p:spTree>
     <p:extLst>
       <p:ext uri="{BB962C8B-B14F-4D97-AF65-F5344CB8AC3E}">
-        <p14:creationId xmlns:p14="http://schemas.microsoft.com/office/powerpoint/2010/main" val="2022345022"/>
+        <p14:creationId xmlns:p14="http://schemas.microsoft.com/office/powerpoint/2010/main" val="1881299487"/>
       </p:ext>
     </p:extLst>
   </p:cSld>
@@ -8382,8 +8497,8 @@
         </p:blipFill>
         <p:spPr>
           <a:xfrm>
-            <a:off x="597371" y="1053745"/>
-            <a:ext cx="7841258" cy="5066068"/>
+            <a:off x="759542" y="1253754"/>
+            <a:ext cx="7516916" cy="4866059"/>
           </a:xfrm>
         </p:spPr>
       </p:pic>
@@ -8412,131 +8527,40 @@
       </p:sp>
       <p:sp>
         <p:nvSpPr>
-          <p:cNvPr id="5" name="Rectangle 4">
+          <p:cNvPr id="5" name="TextBox 4">
             <a:hlinkClick r:id="rId3" action="ppaction://hlinksldjump"/>
           </p:cNvPr>
-          <p:cNvSpPr/>
+          <p:cNvSpPr txBox="1"/>
           <p:nvPr/>
         </p:nvSpPr>
         <p:spPr>
           <a:xfrm>
-            <a:off x="5598367" y="2248678"/>
-            <a:ext cx="718457" cy="186612"/>
+            <a:off x="6774025" y="5495731"/>
+            <a:ext cx="690466" cy="261610"/>
           </a:xfrm>
           <a:prstGeom prst="rect">
             <a:avLst/>
           </a:prstGeom>
           <a:noFill/>
         </p:spPr>
-        <p:style>
-          <a:lnRef idx="1">
-            <a:schemeClr val="accent1"/>
-          </a:lnRef>
-          <a:fillRef idx="3">
-            <a:schemeClr val="accent1"/>
-          </a:fillRef>
-          <a:effectRef idx="2">
-            <a:schemeClr val="accent1"/>
-          </a:effectRef>
-          <a:fontRef idx="minor">
-            <a:schemeClr val="lt1"/>
-          </a:fontRef>
-        </p:style>
-        <p:txBody>
-          <a:bodyPr rtlCol="0" anchor="ctr"/>
+        <p:txBody>
+          <a:bodyPr wrap="square" rtlCol="0">
+            <a:spAutoFit/>
+          </a:bodyPr>
           <a:lstStyle/>
           <a:p>
-            <a:pPr algn="ctr"/>
-            <a:endParaRPr lang="en-GB"/>
-          </a:p>
-        </p:txBody>
-      </p:sp>
-      <p:sp>
-        <p:nvSpPr>
-          <p:cNvPr id="6" name="Rectangle 5">
-            <a:hlinkClick r:id="rId4" action="ppaction://hlinksldjump"/>
-          </p:cNvPr>
-          <p:cNvSpPr/>
-          <p:nvPr/>
-        </p:nvSpPr>
-        <p:spPr>
-          <a:xfrm>
-            <a:off x="5598366" y="3400167"/>
-            <a:ext cx="718457" cy="186612"/>
-          </a:xfrm>
-          <a:prstGeom prst="rect">
-            <a:avLst/>
-          </a:prstGeom>
-          <a:noFill/>
-        </p:spPr>
-        <p:style>
-          <a:lnRef idx="1">
-            <a:schemeClr val="accent1"/>
-          </a:lnRef>
-          <a:fillRef idx="3">
-            <a:schemeClr val="accent1"/>
-          </a:fillRef>
-          <a:effectRef idx="2">
-            <a:schemeClr val="accent1"/>
-          </a:effectRef>
-          <a:fontRef idx="minor">
-            <a:schemeClr val="lt1"/>
-          </a:fontRef>
-        </p:style>
-        <p:txBody>
-          <a:bodyPr rtlCol="0" anchor="ctr"/>
-          <a:lstStyle/>
-          <a:p>
-            <a:pPr algn="ctr"/>
-            <a:endParaRPr lang="en-GB"/>
-          </a:p>
-        </p:txBody>
-      </p:sp>
-      <p:sp>
-        <p:nvSpPr>
-          <p:cNvPr id="7" name="Rectangle 6">
-            <a:hlinkClick r:id="rId5" action="ppaction://hlinksldjump"/>
-          </p:cNvPr>
-          <p:cNvSpPr/>
-          <p:nvPr/>
-        </p:nvSpPr>
-        <p:spPr>
-          <a:xfrm>
-            <a:off x="5598365" y="4551656"/>
-            <a:ext cx="718457" cy="186612"/>
-          </a:xfrm>
-          <a:prstGeom prst="rect">
-            <a:avLst/>
-          </a:prstGeom>
-          <a:noFill/>
-        </p:spPr>
-        <p:style>
-          <a:lnRef idx="1">
-            <a:schemeClr val="accent1"/>
-          </a:lnRef>
-          <a:fillRef idx="3">
-            <a:schemeClr val="accent1"/>
-          </a:fillRef>
-          <a:effectRef idx="2">
-            <a:schemeClr val="accent1"/>
-          </a:effectRef>
-          <a:fontRef idx="minor">
-            <a:schemeClr val="lt1"/>
-          </a:fontRef>
-        </p:style>
-        <p:txBody>
-          <a:bodyPr rtlCol="0" anchor="ctr"/>
-          <a:lstStyle/>
-          <a:p>
-            <a:pPr algn="ctr"/>
-            <a:endParaRPr lang="en-GB"/>
+            <a:r>
+              <a:rPr lang="en-GB" sz="1100" dirty="0" err="1"/>
+              <a:t>zurück</a:t>
+            </a:r>
+            <a:endParaRPr lang="en-GB" sz="1100" dirty="0"/>
           </a:p>
         </p:txBody>
       </p:sp>
     </p:spTree>
     <p:extLst>
       <p:ext uri="{BB962C8B-B14F-4D97-AF65-F5344CB8AC3E}">
-        <p14:creationId xmlns:p14="http://schemas.microsoft.com/office/powerpoint/2010/main" val="1881299487"/>
+        <p14:creationId xmlns:p14="http://schemas.microsoft.com/office/powerpoint/2010/main" val="3685747844"/>
       </p:ext>
     </p:extLst>
   </p:cSld>
@@ -8581,8 +8605,8 @@
         </p:blipFill>
         <p:spPr>
           <a:xfrm>
-            <a:off x="759542" y="1253754"/>
-            <a:ext cx="7516916" cy="4866059"/>
+            <a:off x="625931" y="1176647"/>
+            <a:ext cx="7784138" cy="5017811"/>
           </a:xfrm>
         </p:spPr>
       </p:pic>
@@ -8644,7 +8668,7 @@
     </p:spTree>
     <p:extLst>
       <p:ext uri="{BB962C8B-B14F-4D97-AF65-F5344CB8AC3E}">
-        <p14:creationId xmlns:p14="http://schemas.microsoft.com/office/powerpoint/2010/main" val="3685747844"/>
+        <p14:creationId xmlns:p14="http://schemas.microsoft.com/office/powerpoint/2010/main" val="3596287467"/>
       </p:ext>
     </p:extLst>
   </p:cSld>
@@ -8689,8 +8713,8 @@
         </p:blipFill>
         <p:spPr>
           <a:xfrm>
-            <a:off x="625931" y="1176647"/>
-            <a:ext cx="7784138" cy="5017811"/>
+            <a:off x="839085" y="1166327"/>
+            <a:ext cx="7357830" cy="4888172"/>
           </a:xfrm>
         </p:spPr>
       </p:pic>
@@ -8727,7 +8751,7 @@
         </p:nvSpPr>
         <p:spPr>
           <a:xfrm>
-            <a:off x="6774025" y="5495731"/>
+            <a:off x="6662058" y="5364926"/>
             <a:ext cx="690466" cy="261610"/>
           </a:xfrm>
           <a:prstGeom prst="rect">
@@ -8752,7 +8776,7 @@
     </p:spTree>
     <p:extLst>
       <p:ext uri="{BB962C8B-B14F-4D97-AF65-F5344CB8AC3E}">
-        <p14:creationId xmlns:p14="http://schemas.microsoft.com/office/powerpoint/2010/main" val="3596287467"/>
+        <p14:creationId xmlns:p14="http://schemas.microsoft.com/office/powerpoint/2010/main" val="3652327836"/>
       </p:ext>
     </p:extLst>
   </p:cSld>
@@ -8779,37 +8803,14 @@
           <a:chExt cx="0" cy="0"/>
         </a:xfrm>
       </p:grpSpPr>
-      <p:pic>
-        <p:nvPicPr>
-          <p:cNvPr id="4" name="Content Placeholder 3"/>
-          <p:cNvPicPr>
-            <a:picLocks noGrp="1" noChangeAspect="1"/>
-          </p:cNvPicPr>
-          <p:nvPr>
-            <p:ph sz="half" idx="1"/>
-          </p:nvPr>
-        </p:nvPicPr>
-        <p:blipFill>
-          <a:blip r:embed="rId2"/>
-          <a:stretch>
-            <a:fillRect/>
-          </a:stretch>
-        </p:blipFill>
-        <p:spPr>
-          <a:xfrm>
-            <a:off x="839085" y="1166327"/>
-            <a:ext cx="7357830" cy="4888172"/>
-          </a:xfrm>
-        </p:spPr>
-      </p:pic>
-      <p:sp>
-        <p:nvSpPr>
-          <p:cNvPr id="3" name="Title 2"/>
+      <p:sp>
+        <p:nvSpPr>
+          <p:cNvPr id="2" name="Inhaltsplatzhalter 1"/>
           <p:cNvSpPr>
             <a:spLocks noGrp="1"/>
           </p:cNvSpPr>
           <p:nvPr>
-            <p:ph type="ctrTitle"/>
+            <p:ph sz="half" idx="1"/>
           </p:nvPr>
         </p:nvSpPr>
         <p:spPr/>
@@ -8817,50 +8818,43 @@
           <a:bodyPr/>
           <a:lstStyle/>
           <a:p>
-            <a:r>
-              <a:rPr lang="en-GB" dirty="0" err="1"/>
-              <a:t>Prototyp</a:t>
-            </a:r>
-            <a:endParaRPr lang="en-GB" dirty="0"/>
-          </a:p>
-        </p:txBody>
-      </p:sp>
-      <p:sp>
-        <p:nvSpPr>
-          <p:cNvPr id="5" name="TextBox 4">
-            <a:hlinkClick r:id="rId3" action="ppaction://hlinksldjump"/>
-          </p:cNvPr>
-          <p:cNvSpPr txBox="1"/>
-          <p:nvPr/>
-        </p:nvSpPr>
-        <p:spPr>
-          <a:xfrm>
-            <a:off x="6662058" y="5364926"/>
-            <a:ext cx="690466" cy="261610"/>
-          </a:xfrm>
-          <a:prstGeom prst="rect">
-            <a:avLst/>
-          </a:prstGeom>
-          <a:noFill/>
-        </p:spPr>
-        <p:txBody>
-          <a:bodyPr wrap="square" rtlCol="0">
-            <a:spAutoFit/>
-          </a:bodyPr>
+            <a:endParaRPr lang="de-DE" dirty="0"/>
+          </a:p>
+        </p:txBody>
+      </p:sp>
+      <p:sp>
+        <p:nvSpPr>
+          <p:cNvPr id="3" name="Titel 2"/>
+          <p:cNvSpPr>
+            <a:spLocks noGrp="1"/>
+          </p:cNvSpPr>
+          <p:nvPr>
+            <p:ph type="ctrTitle"/>
+          </p:nvPr>
+        </p:nvSpPr>
+        <p:spPr/>
+        <p:txBody>
+          <a:bodyPr/>
           <a:lstStyle/>
           <a:p>
             <a:r>
-              <a:rPr lang="en-GB" sz="1100" dirty="0" err="1"/>
-              <a:t>zurück</a:t>
-            </a:r>
-            <a:endParaRPr lang="en-GB" sz="1100" dirty="0"/>
+              <a:rPr lang="de-CH" dirty="0"/>
+              <a:t>Validation</a:t>
+            </a:r>
+            <a:br>
+              <a:rPr lang="de-CH" dirty="0"/>
+            </a:br>
+            <a:br>
+              <a:rPr lang="de-CH" dirty="0"/>
+            </a:br>
+            <a:endParaRPr lang="de-DE" dirty="0"/>
           </a:p>
         </p:txBody>
       </p:sp>
     </p:spTree>
     <p:extLst>
       <p:ext uri="{BB962C8B-B14F-4D97-AF65-F5344CB8AC3E}">
-        <p14:creationId xmlns:p14="http://schemas.microsoft.com/office/powerpoint/2010/main" val="3652327836"/>
+        <p14:creationId xmlns:p14="http://schemas.microsoft.com/office/powerpoint/2010/main" val="904193018"/>
       </p:ext>
     </p:extLst>
   </p:cSld>
@@ -8889,156 +8883,6 @@
       </p:grpSpPr>
       <p:sp>
         <p:nvSpPr>
-          <p:cNvPr id="2" name="Inhaltsplatzhalter 1"/>
-          <p:cNvSpPr>
-            <a:spLocks noGrp="1"/>
-          </p:cNvSpPr>
-          <p:nvPr>
-            <p:ph sz="half" idx="1"/>
-          </p:nvPr>
-        </p:nvSpPr>
-        <p:spPr/>
-        <p:txBody>
-          <a:bodyPr/>
-          <a:lstStyle/>
-          <a:p>
-            <a:endParaRPr lang="de-DE" dirty="0"/>
-          </a:p>
-        </p:txBody>
-      </p:sp>
-      <p:sp>
-        <p:nvSpPr>
-          <p:cNvPr id="3" name="Titel 2"/>
-          <p:cNvSpPr>
-            <a:spLocks noGrp="1"/>
-          </p:cNvSpPr>
-          <p:nvPr>
-            <p:ph type="ctrTitle"/>
-          </p:nvPr>
-        </p:nvSpPr>
-        <p:spPr/>
-        <p:txBody>
-          <a:bodyPr/>
-          <a:lstStyle/>
-          <a:p>
-            <a:r>
-              <a:rPr lang="de-CH" dirty="0"/>
-              <a:t>Validation</a:t>
-            </a:r>
-            <a:br>
-              <a:rPr lang="de-CH" dirty="0"/>
-            </a:br>
-            <a:br>
-              <a:rPr lang="de-CH" dirty="0"/>
-            </a:br>
-            <a:endParaRPr lang="de-DE" dirty="0"/>
-          </a:p>
-        </p:txBody>
-      </p:sp>
-    </p:spTree>
-    <p:extLst>
-      <p:ext uri="{BB962C8B-B14F-4D97-AF65-F5344CB8AC3E}">
-        <p14:creationId xmlns:p14="http://schemas.microsoft.com/office/powerpoint/2010/main" val="904193018"/>
-      </p:ext>
-    </p:extLst>
-  </p:cSld>
-  <p:clrMapOvr>
-    <a:masterClrMapping/>
-  </p:clrMapOvr>
-</p:sld>
-</file>
-
-<file path=ppt/slides/slide3.xml><?xml version="1.0" encoding="utf-8"?>
-<p:sld xmlns:a="http://schemas.openxmlformats.org/drawingml/2006/main" xmlns:r="http://schemas.openxmlformats.org/officeDocument/2006/relationships" xmlns:p="http://schemas.openxmlformats.org/presentationml/2006/main">
-  <p:cSld>
-    <p:spTree>
-      <p:nvGrpSpPr>
-        <p:cNvPr id="1" name=""/>
-        <p:cNvGrpSpPr/>
-        <p:nvPr/>
-      </p:nvGrpSpPr>
-      <p:grpSpPr>
-        <a:xfrm>
-          <a:off x="0" y="0"/>
-          <a:ext cx="0" cy="0"/>
-          <a:chOff x="0" y="0"/>
-          <a:chExt cx="0" cy="0"/>
-        </a:xfrm>
-      </p:grpSpPr>
-      <p:sp>
-        <p:nvSpPr>
-          <p:cNvPr id="2" name="Inhaltsplatzhalter 1"/>
-          <p:cNvSpPr>
-            <a:spLocks noGrp="1"/>
-          </p:cNvSpPr>
-          <p:nvPr>
-            <p:ph sz="half" idx="1"/>
-          </p:nvPr>
-        </p:nvSpPr>
-        <p:spPr/>
-        <p:txBody>
-          <a:bodyPr/>
-          <a:lstStyle/>
-          <a:p>
-            <a:endParaRPr lang="de-DE" dirty="0"/>
-          </a:p>
-        </p:txBody>
-      </p:sp>
-      <p:sp>
-        <p:nvSpPr>
-          <p:cNvPr id="3" name="Titel 2"/>
-          <p:cNvSpPr>
-            <a:spLocks noGrp="1"/>
-          </p:cNvSpPr>
-          <p:nvPr>
-            <p:ph type="ctrTitle"/>
-          </p:nvPr>
-        </p:nvSpPr>
-        <p:spPr/>
-        <p:txBody>
-          <a:bodyPr/>
-          <a:lstStyle/>
-          <a:p>
-            <a:r>
-              <a:rPr lang="de-DE" dirty="0" err="1"/>
-              <a:t>Scoping</a:t>
-            </a:r>
-            <a:endParaRPr lang="de-DE" dirty="0"/>
-          </a:p>
-        </p:txBody>
-      </p:sp>
-    </p:spTree>
-    <p:extLst>
-      <p:ext uri="{BB962C8B-B14F-4D97-AF65-F5344CB8AC3E}">
-        <p14:creationId xmlns:p14="http://schemas.microsoft.com/office/powerpoint/2010/main" val="4165120890"/>
-      </p:ext>
-    </p:extLst>
-  </p:cSld>
-  <p:clrMapOvr>
-    <a:masterClrMapping/>
-  </p:clrMapOvr>
-</p:sld>
-</file>
-
-<file path=ppt/slides/slide30.xml><?xml version="1.0" encoding="utf-8"?>
-<p:sld xmlns:a="http://schemas.openxmlformats.org/drawingml/2006/main" xmlns:r="http://schemas.openxmlformats.org/officeDocument/2006/relationships" xmlns:p="http://schemas.openxmlformats.org/presentationml/2006/main">
-  <p:cSld>
-    <p:spTree>
-      <p:nvGrpSpPr>
-        <p:cNvPr id="1" name=""/>
-        <p:cNvGrpSpPr/>
-        <p:nvPr/>
-      </p:nvGrpSpPr>
-      <p:grpSpPr>
-        <a:xfrm>
-          <a:off x="0" y="0"/>
-          <a:ext cx="0" cy="0"/>
-          <a:chOff x="0" y="0"/>
-          <a:chExt cx="0" cy="0"/>
-        </a:xfrm>
-      </p:grpSpPr>
-      <p:sp>
-        <p:nvSpPr>
           <p:cNvPr id="7" name="Titel 6"/>
           <p:cNvSpPr>
             <a:spLocks noGrp="1"/>
@@ -9076,7 +8920,7 @@
 </p:sld>
 </file>
 
-<file path=ppt/slides/slide4.xml><?xml version="1.0" encoding="utf-8"?>
+<file path=ppt/slides/slide3.xml><?xml version="1.0" encoding="utf-8"?>
 <p:sld xmlns:a="http://schemas.openxmlformats.org/drawingml/2006/main" xmlns:r="http://schemas.openxmlformats.org/officeDocument/2006/relationships" xmlns:p="http://schemas.openxmlformats.org/presentationml/2006/main">
   <p:cSld>
     <p:spTree>
@@ -9477,7 +9321,7 @@
 </p:sld>
 </file>
 
-<file path=ppt/slides/slide5.xml><?xml version="1.0" encoding="utf-8"?>
+<file path=ppt/slides/slide4.xml><?xml version="1.0" encoding="utf-8"?>
 <p:sld xmlns:a="http://schemas.openxmlformats.org/drawingml/2006/main" xmlns:r="http://schemas.openxmlformats.org/officeDocument/2006/relationships" xmlns:p="http://schemas.openxmlformats.org/presentationml/2006/main">
   <p:cSld>
     <p:spTree>
@@ -10050,7 +9894,7 @@
 </p:sld>
 </file>
 
-<file path=ppt/slides/slide6.xml><?xml version="1.0" encoding="utf-8"?>
+<file path=ppt/slides/slide5.xml><?xml version="1.0" encoding="utf-8"?>
 <p:sld xmlns:a="http://schemas.openxmlformats.org/drawingml/2006/main" xmlns:r="http://schemas.openxmlformats.org/officeDocument/2006/relationships" xmlns:p="http://schemas.openxmlformats.org/presentationml/2006/main">
   <p:cSld>
     <p:spTree>
@@ -10608,7 +10452,7 @@
 </p:sld>
 </file>
 
-<file path=ppt/slides/slide7.xml><?xml version="1.0" encoding="utf-8"?>
+<file path=ppt/slides/slide6.xml><?xml version="1.0" encoding="utf-8"?>
 <p:sld xmlns:a="http://schemas.openxmlformats.org/drawingml/2006/main" xmlns:r="http://schemas.openxmlformats.org/officeDocument/2006/relationships" xmlns:p="http://schemas.openxmlformats.org/presentationml/2006/main">
   <p:cSld>
     <p:spTree>
@@ -10920,6 +10764,123 @@
 </p:sld>
 </file>
 
+<file path=ppt/slides/slide7.xml><?xml version="1.0" encoding="utf-8"?>
+<p:sld xmlns:a="http://schemas.openxmlformats.org/drawingml/2006/main" xmlns:r="http://schemas.openxmlformats.org/officeDocument/2006/relationships" xmlns:p="http://schemas.openxmlformats.org/presentationml/2006/main">
+  <p:cSld>
+    <p:spTree>
+      <p:nvGrpSpPr>
+        <p:cNvPr id="1" name=""/>
+        <p:cNvGrpSpPr/>
+        <p:nvPr/>
+      </p:nvGrpSpPr>
+      <p:grpSpPr>
+        <a:xfrm>
+          <a:off x="0" y="0"/>
+          <a:ext cx="0" cy="0"/>
+          <a:chOff x="0" y="0"/>
+          <a:chExt cx="0" cy="0"/>
+        </a:xfrm>
+      </p:grpSpPr>
+      <p:sp>
+        <p:nvSpPr>
+          <p:cNvPr id="2" name="Inhaltsplatzhalter 1"/>
+          <p:cNvSpPr>
+            <a:spLocks noGrp="1"/>
+          </p:cNvSpPr>
+          <p:nvPr>
+            <p:ph sz="half" idx="1"/>
+          </p:nvPr>
+        </p:nvSpPr>
+        <p:spPr/>
+        <p:txBody>
+          <a:bodyPr/>
+          <a:lstStyle/>
+          <a:p>
+            <a:r>
+              <a:rPr lang="de-DE" dirty="0"/>
+              <a:t>Arzt Dr. Wenger</a:t>
+            </a:r>
+          </a:p>
+          <a:p>
+            <a:r>
+              <a:rPr lang="de-DE" dirty="0"/>
+              <a:t>Med. Fachpersonal Frau Meier</a:t>
+            </a:r>
+          </a:p>
+          <a:p>
+            <a:pPr marL="0" indent="0">
+              <a:buNone/>
+            </a:pPr>
+            <a:endParaRPr lang="de-DE" dirty="0"/>
+          </a:p>
+          <a:p>
+            <a:r>
+              <a:rPr lang="de-DE" dirty="0"/>
+              <a:t>Bedarf: </a:t>
+            </a:r>
+          </a:p>
+          <a:p>
+            <a:pPr lvl="1"/>
+            <a:r>
+              <a:rPr lang="de-DE" dirty="0"/>
+              <a:t>Stammdaten</a:t>
+            </a:r>
+          </a:p>
+          <a:p>
+            <a:pPr lvl="1"/>
+            <a:r>
+              <a:rPr lang="de-DE" dirty="0"/>
+              <a:t>Patientenübersicht</a:t>
+            </a:r>
+          </a:p>
+          <a:p>
+            <a:pPr lvl="1"/>
+            <a:r>
+              <a:rPr lang="de-DE" dirty="0"/>
+              <a:t>Direktzugriff auf Dokumentation</a:t>
+            </a:r>
+          </a:p>
+          <a:p>
+            <a:endParaRPr lang="de-DE" dirty="0"/>
+          </a:p>
+        </p:txBody>
+      </p:sp>
+      <p:sp>
+        <p:nvSpPr>
+          <p:cNvPr id="3" name="Titel 2"/>
+          <p:cNvSpPr>
+            <a:spLocks noGrp="1"/>
+          </p:cNvSpPr>
+          <p:nvPr>
+            <p:ph type="ctrTitle"/>
+          </p:nvPr>
+        </p:nvSpPr>
+        <p:spPr/>
+        <p:txBody>
+          <a:bodyPr/>
+          <a:lstStyle/>
+          <a:p>
+            <a:r>
+              <a:rPr lang="de-CH" dirty="0" err="1"/>
+              <a:t>Synthesize</a:t>
+            </a:r>
+            <a:endParaRPr lang="de-DE" dirty="0"/>
+          </a:p>
+        </p:txBody>
+      </p:sp>
+    </p:spTree>
+    <p:extLst>
+      <p:ext uri="{BB962C8B-B14F-4D97-AF65-F5344CB8AC3E}">
+        <p14:creationId xmlns:p14="http://schemas.microsoft.com/office/powerpoint/2010/main" val="1019839237"/>
+      </p:ext>
+    </p:extLst>
+  </p:cSld>
+  <p:clrMapOvr>
+    <a:masterClrMapping/>
+  </p:clrMapOvr>
+</p:sld>
+</file>
+
 <file path=ppt/slides/slide8.xml><?xml version="1.0" encoding="utf-8"?>
 <p:sld xmlns:a="http://schemas.openxmlformats.org/drawingml/2006/main" xmlns:r="http://schemas.openxmlformats.org/officeDocument/2006/relationships" xmlns:p="http://schemas.openxmlformats.org/presentationml/2006/main">
   <p:cSld>
@@ -10939,25 +10900,6 @@
       </p:grpSpPr>
       <p:sp>
         <p:nvSpPr>
-          <p:cNvPr id="2" name="Inhaltsplatzhalter 1"/>
-          <p:cNvSpPr>
-            <a:spLocks noGrp="1"/>
-          </p:cNvSpPr>
-          <p:nvPr>
-            <p:ph sz="half" idx="1"/>
-          </p:nvPr>
-        </p:nvSpPr>
-        <p:spPr/>
-        <p:txBody>
-          <a:bodyPr/>
-          <a:lstStyle/>
-          <a:p>
-            <a:endParaRPr lang="de-DE" dirty="0"/>
-          </a:p>
-        </p:txBody>
-      </p:sp>
-      <p:sp>
-        <p:nvSpPr>
           <p:cNvPr id="3" name="Titel 2"/>
           <p:cNvSpPr>
             <a:spLocks noGrp="1"/>
@@ -10972,17 +10914,40 @@
           <a:lstStyle/>
           <a:p>
             <a:r>
-              <a:rPr lang="de-CH" dirty="0" err="1"/>
-              <a:t>Synthesize</a:t>
+              <a:rPr lang="de-CH" dirty="0"/>
+              <a:t>Storyboard</a:t>
             </a:r>
             <a:endParaRPr lang="de-DE" dirty="0"/>
           </a:p>
         </p:txBody>
       </p:sp>
+      <p:pic>
+        <p:nvPicPr>
+          <p:cNvPr id="5" name="Inhaltsplatzhalter 4"/>
+          <p:cNvPicPr>
+            <a:picLocks noGrp="1" noChangeAspect="1"/>
+          </p:cNvPicPr>
+          <p:nvPr>
+            <p:ph sz="half" idx="1"/>
+          </p:nvPr>
+        </p:nvPicPr>
+        <p:blipFill>
+          <a:blip r:embed="rId2"/>
+          <a:stretch>
+            <a:fillRect/>
+          </a:stretch>
+        </p:blipFill>
+        <p:spPr>
+          <a:xfrm>
+            <a:off x="2150520" y="1483327"/>
+            <a:ext cx="5224785" cy="3911527"/>
+          </a:xfrm>
+        </p:spPr>
+      </p:pic>
     </p:spTree>
     <p:extLst>
       <p:ext uri="{BB962C8B-B14F-4D97-AF65-F5344CB8AC3E}">
-        <p14:creationId xmlns:p14="http://schemas.microsoft.com/office/powerpoint/2010/main" val="1019839237"/>
+        <p14:creationId xmlns:p14="http://schemas.microsoft.com/office/powerpoint/2010/main" val="1617111469"/>
       </p:ext>
     </p:extLst>
   </p:cSld>
@@ -11009,9 +10974,32 @@
           <a:chExt cx="0" cy="0"/>
         </a:xfrm>
       </p:grpSpPr>
+      <p:sp>
+        <p:nvSpPr>
+          <p:cNvPr id="3" name="Titel 2"/>
+          <p:cNvSpPr>
+            <a:spLocks noGrp="1"/>
+          </p:cNvSpPr>
+          <p:nvPr>
+            <p:ph type="ctrTitle"/>
+          </p:nvPr>
+        </p:nvSpPr>
+        <p:spPr/>
+        <p:txBody>
+          <a:bodyPr/>
+          <a:lstStyle/>
+          <a:p>
+            <a:r>
+              <a:rPr lang="de-CH" dirty="0"/>
+              <a:t>Storyboard</a:t>
+            </a:r>
+            <a:endParaRPr lang="de-DE" dirty="0"/>
+          </a:p>
+        </p:txBody>
+      </p:sp>
       <p:pic>
         <p:nvPicPr>
-          <p:cNvPr id="4" name="Inhaltsplatzhalter 3"/>
+          <p:cNvPr id="5" name="Inhaltsplatzhalter 4"/>
           <p:cNvPicPr>
             <a:picLocks noGrp="1" noChangeAspect="1"/>
           </p:cNvPicPr>
@@ -11020,144 +11008,28 @@
           </p:nvPr>
         </p:nvPicPr>
         <p:blipFill>
-          <a:blip r:embed="rId2">
-            <a:extLst>
-              <a:ext uri="{BEBA8EAE-BF5A-486C-A8C5-ECC9F3942E4B}">
-                <a14:imgProps xmlns:a14="http://schemas.microsoft.com/office/drawing/2010/main">
-                  <a14:imgLayer r:embed="rId3">
-                    <a14:imgEffect>
-                      <a14:sharpenSoften amount="25000"/>
-                    </a14:imgEffect>
-                    <a14:imgEffect>
-                      <a14:brightnessContrast contrast="20000"/>
-                    </a14:imgEffect>
-                  </a14:imgLayer>
-                </a14:imgProps>
-              </a:ext>
-            </a:extLst>
-          </a:blip>
+          <a:blip r:embed="rId2"/>
           <a:stretch>
             <a:fillRect/>
           </a:stretch>
         </p:blipFill>
         <p:spPr>
           <a:xfrm>
-            <a:off x="1971614" y="1416835"/>
-            <a:ext cx="4915318" cy="3679845"/>
+            <a:off x="1667068" y="1868557"/>
+            <a:ext cx="5917528" cy="3302807"/>
           </a:xfrm>
         </p:spPr>
       </p:pic>
-      <p:sp>
-        <p:nvSpPr>
-          <p:cNvPr id="3" name="Titel 2"/>
-          <p:cNvSpPr>
-            <a:spLocks noGrp="1"/>
-          </p:cNvSpPr>
-          <p:nvPr>
-            <p:ph type="ctrTitle"/>
-          </p:nvPr>
-        </p:nvSpPr>
-        <p:spPr/>
-        <p:txBody>
-          <a:bodyPr/>
-          <a:lstStyle/>
-          <a:p>
-            <a:r>
-              <a:rPr lang="de-CH" dirty="0"/>
-              <a:t>Storyboard</a:t>
-            </a:r>
-            <a:endParaRPr lang="de-DE" dirty="0"/>
-          </a:p>
-        </p:txBody>
-      </p:sp>
     </p:spTree>
     <p:extLst>
       <p:ext uri="{BB962C8B-B14F-4D97-AF65-F5344CB8AC3E}">
-        <p14:creationId xmlns:p14="http://schemas.microsoft.com/office/powerpoint/2010/main" val="1617111469"/>
+        <p14:creationId xmlns:p14="http://schemas.microsoft.com/office/powerpoint/2010/main" val="3302576479"/>
       </p:ext>
     </p:extLst>
   </p:cSld>
   <p:clrMapOvr>
     <a:masterClrMapping/>
   </p:clrMapOvr>
-  <p:timing>
-    <p:tnLst>
-      <p:par>
-        <p:cTn id="1" dur="indefinite" restart="never" nodeType="tmRoot">
-          <p:childTnLst>
-            <p:seq concurrent="1" nextAc="seek">
-              <p:cTn id="2" dur="indefinite" nodeType="mainSeq">
-                <p:childTnLst>
-                  <p:par>
-                    <p:cTn id="3" fill="hold">
-                      <p:stCondLst>
-                        <p:cond delay="indefinite"/>
-                        <p:cond evt="onBegin" delay="0">
-                          <p:tn val="2"/>
-                        </p:cond>
-                      </p:stCondLst>
-                      <p:childTnLst>
-                        <p:par>
-                          <p:cTn id="4" fill="hold">
-                            <p:stCondLst>
-                              <p:cond delay="0"/>
-                            </p:stCondLst>
-                            <p:childTnLst>
-                              <p:par>
-                                <p:cTn id="5" presetID="1" presetClass="exit" presetSubtype="0" fill="hold" nodeType="withEffect">
-                                  <p:stCondLst>
-                                    <p:cond delay="0"/>
-                                  </p:stCondLst>
-                                  <p:childTnLst>
-                                    <p:set>
-                                      <p:cBhvr>
-                                        <p:cTn id="6" dur="1" fill="hold">
-                                          <p:stCondLst>
-                                            <p:cond delay="0"/>
-                                          </p:stCondLst>
-                                        </p:cTn>
-                                        <p:tgtEl>
-                                          <p:spTgt spid="4"/>
-                                        </p:tgtEl>
-                                        <p:attrNameLst>
-                                          <p:attrName>style.visibility</p:attrName>
-                                        </p:attrNameLst>
-                                      </p:cBhvr>
-                                      <p:to>
-                                        <p:strVal val="hidden"/>
-                                      </p:to>
-                                    </p:set>
-                                  </p:childTnLst>
-                                </p:cTn>
-                              </p:par>
-                            </p:childTnLst>
-                          </p:cTn>
-                        </p:par>
-                      </p:childTnLst>
-                    </p:cTn>
-                  </p:par>
-                </p:childTnLst>
-              </p:cTn>
-              <p:prevCondLst>
-                <p:cond evt="onPrev" delay="0">
-                  <p:tgtEl>
-                    <p:sldTgt/>
-                  </p:tgtEl>
-                </p:cond>
-              </p:prevCondLst>
-              <p:nextCondLst>
-                <p:cond evt="onNext" delay="0">
-                  <p:tgtEl>
-                    <p:sldTgt/>
-                  </p:tgtEl>
-                </p:cond>
-              </p:nextCondLst>
-            </p:seq>
-          </p:childTnLst>
-        </p:cTn>
-      </p:par>
-    </p:tnLst>
-  </p:timing>
 </p:sld>
 </file>
 
@@ -11992,6 +11864,15 @@
 </file>
 
 <file path=customXml/item1.xml><?xml version="1.0" encoding="utf-8"?>
+<?mso-contentType ?>
+<FormTemplates xmlns="http://schemas.microsoft.com/sharepoint/v3/contenttype/forms">
+  <Display>DocumentLibraryForm</Display>
+  <Edit>DocumentLibraryForm</Edit>
+  <New>DocumentLibraryForm</New>
+</FormTemplates>
+</file>
+
+<file path=customXml/item2.xml><?xml version="1.0" encoding="utf-8"?>
 <ct:contentTypeSchema xmlns:ct="http://schemas.microsoft.com/office/2006/metadata/contentType" xmlns:ma="http://schemas.microsoft.com/office/2006/metadata/properties/metaAttributes" ct:_="" ma:_="" ma:contentTypeName="Dokument" ma:contentTypeID="0x0101003A4279409C3118409D418E682AEFAFB0" ma:contentTypeVersion="3" ma:contentTypeDescription="Ein neues Dokument erstellen." ma:contentTypeScope="" ma:versionID="2b39eecd042fe67817287380b00d4728">
   <xsd:schema xmlns:xsd="http://www.w3.org/2001/XMLSchema" xmlns:p="http://schemas.microsoft.com/office/2006/metadata/properties" xmlns:ns2="238ac175-5152-443e-bf42-417a27926292" targetNamespace="http://schemas.microsoft.com/office/2006/metadata/properties" ma:root="true" ma:fieldsID="3e4ac4b9de63a8d8211a46de917ff848" ns2:_="">
     <xsd:import namespace="238ac175-5152-443e-bf42-417a27926292"/>
@@ -12075,15 +11956,6 @@
 </ct:contentTypeSchema>
 </file>
 
-<file path=customXml/item2.xml><?xml version="1.0" encoding="utf-8"?>
-<?mso-contentType ?>
-<FormTemplates xmlns="http://schemas.microsoft.com/sharepoint/v3/contenttype/forms">
-  <Display>DocumentLibraryForm</Display>
-  <Edit>DocumentLibraryForm</Edit>
-  <New>DocumentLibraryForm</New>
-</FormTemplates>
-</file>
-
 <file path=customXml/item3.xml><?xml version="1.0" encoding="utf-8"?>
 <p:properties xmlns:p="http://schemas.microsoft.com/office/2006/metadata/properties" xmlns:xsi="http://www.w3.org/2001/XMLSchema-instance">
   <documentManagement>
@@ -12095,6 +11967,14 @@
 </file>
 
 <file path=customXml/itemProps1.xml><?xml version="1.0" encoding="utf-8"?>
+<ds:datastoreItem xmlns:ds="http://schemas.openxmlformats.org/officeDocument/2006/customXml" ds:itemID="{FCD14AB6-6E58-442F-B70D-2B317664A115}">
+  <ds:schemaRefs>
+    <ds:schemaRef ds:uri="http://schemas.microsoft.com/sharepoint/v3/contenttype/forms"/>
+  </ds:schemaRefs>
+</ds:datastoreItem>
+</file>
+
+<file path=customXml/itemProps2.xml><?xml version="1.0" encoding="utf-8"?>
 <ds:datastoreItem xmlns:ds="http://schemas.openxmlformats.org/officeDocument/2006/customXml" ds:itemID="{BD8FD62B-E50E-4101-B7F8-577C2BC63D28}">
   <ds:schemaRefs>
     <ds:schemaRef ds:uri="http://schemas.microsoft.com/office/2006/metadata/contentType"/>
@@ -12107,14 +11987,6 @@
     <ds:schemaRef ds:uri="http://purl.org/dc/elements/1.1/"/>
     <ds:schemaRef ds:uri="http://purl.org/dc/terms/"/>
     <ds:schemaRef ds:uri="http://schemas.microsoft.com/office/internal/2005/internalDocumentation"/>
-  </ds:schemaRefs>
-</ds:datastoreItem>
-</file>
-
-<file path=customXml/itemProps2.xml><?xml version="1.0" encoding="utf-8"?>
-<ds:datastoreItem xmlns:ds="http://schemas.openxmlformats.org/officeDocument/2006/customXml" ds:itemID="{FCD14AB6-6E58-442F-B70D-2B317664A115}">
-  <ds:schemaRefs>
-    <ds:schemaRef ds:uri="http://schemas.microsoft.com/sharepoint/v3/contenttype/forms"/>
   </ds:schemaRefs>
 </ds:datastoreItem>
 </file>

</xml_diff>